<commit_message>
Added broken x-axis for FEMM pictures and some other cosmetic changes
</commit_message>
<xml_diff>
--- a/figures/IPEC_Figure_AirGap.pptx
+++ b/figures/IPEC_Figure_AirGap.pptx
@@ -3766,6 +3766,58 @@
           <a:chExt cx="0" cy="0"/>
         </a:xfrm>
       </p:grpSpPr>
+      <p:sp>
+        <p:nvSpPr>
+          <p:cNvPr id="14" name="Rechteck 13">
+            <a:extLst>
+              <a:ext uri="{FF2B5EF4-FFF2-40B4-BE49-F238E27FC236}">
+                <a16:creationId xmlns:a16="http://schemas.microsoft.com/office/drawing/2014/main" id="{3D67335D-D984-4484-ADA6-049E73EB9ADE}"/>
+              </a:ext>
+            </a:extLst>
+          </p:cNvPr>
+          <p:cNvSpPr/>
+          <p:nvPr/>
+        </p:nvSpPr>
+        <p:spPr>
+          <a:xfrm>
+            <a:off x="4753130" y="10038695"/>
+            <a:ext cx="575775" cy="351432"/>
+          </a:xfrm>
+          <a:prstGeom prst="rect">
+            <a:avLst/>
+          </a:prstGeom>
+          <a:solidFill>
+            <a:srgbClr val="FF00FF"/>
+          </a:solidFill>
+          <a:ln>
+            <a:noFill/>
+          </a:ln>
+        </p:spPr>
+        <p:style>
+          <a:lnRef idx="2">
+            <a:schemeClr val="accent1">
+              <a:shade val="15000"/>
+            </a:schemeClr>
+          </a:lnRef>
+          <a:fillRef idx="1">
+            <a:schemeClr val="accent1"/>
+          </a:fillRef>
+          <a:effectRef idx="0">
+            <a:schemeClr val="accent1"/>
+          </a:effectRef>
+          <a:fontRef idx="minor">
+            <a:schemeClr val="lt1"/>
+          </a:fontRef>
+        </p:style>
+        <p:txBody>
+          <a:bodyPr rtlCol="0" anchor="ctr"/>
+          <a:lstStyle/>
+          <a:p>
+            <a:pPr algn="ctr"/>
+            <a:endParaRPr lang="de-DE"/>
+          </a:p>
+        </p:txBody>
+      </p:sp>
       <p:pic>
         <p:nvPicPr>
           <p:cNvPr id="2" name="Grafik 1">
@@ -4151,21 +4203,7 @@
                 <a:latin typeface="Times New Roman" panose="02020603050405020304" pitchFamily="18" charset="0"/>
                 <a:cs typeface="Times New Roman" panose="02020603050405020304" pitchFamily="18" charset="0"/>
               </a:rPr>
-              <a:t>(a) Air-Gap at </a:t>
-            </a:r>
-            <a:r>
-              <a:rPr lang="de-DE" sz="2500" dirty="0" err="1">
-                <a:latin typeface="Times New Roman" panose="02020603050405020304" pitchFamily="18" charset="0"/>
-                <a:cs typeface="Times New Roman" panose="02020603050405020304" pitchFamily="18" charset="0"/>
-              </a:rPr>
-              <a:t>the</a:t>
-            </a:r>
-            <a:r>
-              <a:rPr lang="de-DE" sz="2500" dirty="0">
-                <a:latin typeface="Times New Roman" panose="02020603050405020304" pitchFamily="18" charset="0"/>
-                <a:cs typeface="Times New Roman" panose="02020603050405020304" pitchFamily="18" charset="0"/>
-              </a:rPr>
-              <a:t> top</a:t>
+              <a:t>(a) Air-Gap on top</a:t>
             </a:r>
           </a:p>
         </p:txBody>
@@ -4185,13 +4223,13 @@
           <p:nvPr>
             <p:extLst>
               <p:ext uri="{D42A27DB-BD31-4B8C-83A1-F6EECF244321}">
-                <p14:modId xmlns:p14="http://schemas.microsoft.com/office/powerpoint/2010/main" val="2260001344"/>
+                <p14:modId xmlns:p14="http://schemas.microsoft.com/office/powerpoint/2010/main" val="3353593552"/>
               </p:ext>
             </p:extLst>
           </p:nvPr>
         </p:nvGraphicFramePr>
         <p:xfrm>
-          <a:off x="-103070" y="10388971"/>
+          <a:off x="-313277" y="10388971"/>
           <a:ext cx="5534400" cy="640080"/>
         </p:xfrm>
         <a:graphic>
@@ -5584,7 +5622,7 @@
         </p:nvSpPr>
         <p:spPr>
           <a:xfrm>
-            <a:off x="334926" y="10037999"/>
+            <a:off x="124719" y="10037999"/>
             <a:ext cx="4659318" cy="350972"/>
           </a:xfrm>
           <a:prstGeom prst="rect">
@@ -5668,8 +5706,8 @@
         </p:nvSpPr>
         <p:spPr>
           <a:xfrm>
-            <a:off x="334926" y="10957228"/>
-            <a:ext cx="4659318" cy="477054"/>
+            <a:off x="124719" y="10957228"/>
+            <a:ext cx="5204186" cy="477054"/>
           </a:xfrm>
           <a:prstGeom prst="rect">
             <a:avLst/>
@@ -5708,13 +5746,13 @@
           <p:nvPr>
             <p:extLst>
               <p:ext uri="{D42A27DB-BD31-4B8C-83A1-F6EECF244321}">
-                <p14:modId xmlns:p14="http://schemas.microsoft.com/office/powerpoint/2010/main" val="1082609071"/>
+                <p14:modId xmlns:p14="http://schemas.microsoft.com/office/powerpoint/2010/main" val="2769644625"/>
               </p:ext>
             </p:extLst>
           </p:nvPr>
         </p:nvGraphicFramePr>
         <p:xfrm>
-          <a:off x="5336234" y="10386492"/>
+          <a:off x="5189087" y="10386492"/>
           <a:ext cx="5534400" cy="640080"/>
         </p:xfrm>
         <a:graphic>
@@ -7107,7 +7145,7 @@
         </p:nvSpPr>
         <p:spPr>
           <a:xfrm>
-            <a:off x="5774230" y="10035520"/>
+            <a:off x="5627083" y="10035520"/>
             <a:ext cx="4659318" cy="350972"/>
           </a:xfrm>
           <a:prstGeom prst="rect">
@@ -7191,8 +7229,8 @@
         </p:nvSpPr>
         <p:spPr>
           <a:xfrm>
-            <a:off x="5774230" y="10961345"/>
-            <a:ext cx="4659318" cy="477054"/>
+            <a:off x="5659119" y="10957228"/>
+            <a:ext cx="5122907" cy="477054"/>
           </a:xfrm>
           <a:prstGeom prst="rect">
             <a:avLst/>
@@ -7492,6 +7530,428 @@
           </a:fontRef>
         </p:style>
       </p:cxnSp>
+      <p:grpSp>
+        <p:nvGrpSpPr>
+          <p:cNvPr id="15" name="Gruppieren 14">
+            <a:extLst>
+              <a:ext uri="{FF2B5EF4-FFF2-40B4-BE49-F238E27FC236}">
+                <a16:creationId xmlns:a16="http://schemas.microsoft.com/office/drawing/2014/main" id="{FB902E9A-46F1-FA4F-C1FD-8B61BFCD8C24}"/>
+              </a:ext>
+            </a:extLst>
+          </p:cNvPr>
+          <p:cNvGrpSpPr/>
+          <p:nvPr/>
+        </p:nvGrpSpPr>
+        <p:grpSpPr>
+          <a:xfrm flipH="1">
+            <a:off x="4789738" y="9810023"/>
+            <a:ext cx="468902" cy="782838"/>
+            <a:chOff x="4918572" y="9800498"/>
+            <a:chExt cx="468902" cy="782838"/>
+          </a:xfrm>
+        </p:grpSpPr>
+        <p:sp>
+          <p:nvSpPr>
+            <p:cNvPr id="3" name="Parallelogramm 2">
+              <a:extLst>
+                <a:ext uri="{FF2B5EF4-FFF2-40B4-BE49-F238E27FC236}">
+                  <a16:creationId xmlns:a16="http://schemas.microsoft.com/office/drawing/2014/main" id="{3BE8F138-DB61-0ACF-0E7B-4BE14B95EFB0}"/>
+                </a:ext>
+              </a:extLst>
+            </p:cNvPr>
+            <p:cNvSpPr/>
+            <p:nvPr/>
+          </p:nvSpPr>
+          <p:spPr>
+            <a:xfrm flipH="1">
+              <a:off x="5011163" y="9878606"/>
+              <a:ext cx="277245" cy="623303"/>
+            </a:xfrm>
+            <a:prstGeom prst="parallelogram">
+              <a:avLst>
+                <a:gd name="adj" fmla="val 59975"/>
+              </a:avLst>
+            </a:prstGeom>
+            <a:solidFill>
+              <a:schemeClr val="bg1"/>
+            </a:solidFill>
+            <a:ln w="12700">
+              <a:solidFill>
+                <a:schemeClr val="tx1"/>
+              </a:solidFill>
+            </a:ln>
+          </p:spPr>
+          <p:style>
+            <a:lnRef idx="2">
+              <a:schemeClr val="accent1">
+                <a:shade val="15000"/>
+              </a:schemeClr>
+            </a:lnRef>
+            <a:fillRef idx="1">
+              <a:schemeClr val="accent1"/>
+            </a:fillRef>
+            <a:effectRef idx="0">
+              <a:schemeClr val="accent1"/>
+            </a:effectRef>
+            <a:fontRef idx="minor">
+              <a:schemeClr val="lt1"/>
+            </a:fontRef>
+          </p:style>
+          <p:txBody>
+            <a:bodyPr rtlCol="0" anchor="ctr"/>
+            <a:lstStyle/>
+            <a:p>
+              <a:pPr algn="ctr"/>
+              <a:endParaRPr lang="de-DE"/>
+            </a:p>
+          </p:txBody>
+        </p:sp>
+        <p:sp>
+          <p:nvSpPr>
+            <p:cNvPr id="4" name="Rechteck 3">
+              <a:extLst>
+                <a:ext uri="{FF2B5EF4-FFF2-40B4-BE49-F238E27FC236}">
+                  <a16:creationId xmlns:a16="http://schemas.microsoft.com/office/drawing/2014/main" id="{B5D16E69-8124-812E-90D1-06B3A4E7B2CB}"/>
+                </a:ext>
+              </a:extLst>
+            </p:cNvPr>
+            <p:cNvSpPr/>
+            <p:nvPr/>
+          </p:nvSpPr>
+          <p:spPr>
+            <a:xfrm>
+              <a:off x="4918572" y="9800498"/>
+              <a:ext cx="277246" cy="104775"/>
+            </a:xfrm>
+            <a:prstGeom prst="rect">
+              <a:avLst/>
+            </a:prstGeom>
+            <a:solidFill>
+              <a:schemeClr val="bg1"/>
+            </a:solidFill>
+            <a:ln>
+              <a:solidFill>
+                <a:schemeClr val="bg1"/>
+              </a:solidFill>
+            </a:ln>
+          </p:spPr>
+          <p:style>
+            <a:lnRef idx="2">
+              <a:schemeClr val="accent1">
+                <a:shade val="15000"/>
+              </a:schemeClr>
+            </a:lnRef>
+            <a:fillRef idx="1">
+              <a:schemeClr val="accent1"/>
+            </a:fillRef>
+            <a:effectRef idx="0">
+              <a:schemeClr val="accent1"/>
+            </a:effectRef>
+            <a:fontRef idx="minor">
+              <a:schemeClr val="lt1"/>
+            </a:fontRef>
+          </p:style>
+          <p:txBody>
+            <a:bodyPr rtlCol="0" anchor="ctr"/>
+            <a:lstStyle/>
+            <a:p>
+              <a:pPr algn="ctr"/>
+              <a:endParaRPr lang="de-DE"/>
+            </a:p>
+          </p:txBody>
+        </p:sp>
+        <p:sp>
+          <p:nvSpPr>
+            <p:cNvPr id="12" name="Rechteck 11">
+              <a:extLst>
+                <a:ext uri="{FF2B5EF4-FFF2-40B4-BE49-F238E27FC236}">
+                  <a16:creationId xmlns:a16="http://schemas.microsoft.com/office/drawing/2014/main" id="{9A0C2E33-C646-2B1E-CA44-B750EC2A7240}"/>
+                </a:ext>
+              </a:extLst>
+            </p:cNvPr>
+            <p:cNvSpPr/>
+            <p:nvPr/>
+          </p:nvSpPr>
+          <p:spPr>
+            <a:xfrm>
+              <a:off x="5110228" y="10478561"/>
+              <a:ext cx="277246" cy="104775"/>
+            </a:xfrm>
+            <a:prstGeom prst="rect">
+              <a:avLst/>
+            </a:prstGeom>
+            <a:solidFill>
+              <a:schemeClr val="bg1"/>
+            </a:solidFill>
+            <a:ln>
+              <a:solidFill>
+                <a:schemeClr val="bg1"/>
+              </a:solidFill>
+            </a:ln>
+          </p:spPr>
+          <p:style>
+            <a:lnRef idx="2">
+              <a:schemeClr val="accent1">
+                <a:shade val="15000"/>
+              </a:schemeClr>
+            </a:lnRef>
+            <a:fillRef idx="1">
+              <a:schemeClr val="accent1"/>
+            </a:fillRef>
+            <a:effectRef idx="0">
+              <a:schemeClr val="accent1"/>
+            </a:effectRef>
+            <a:fontRef idx="minor">
+              <a:schemeClr val="lt1"/>
+            </a:fontRef>
+          </p:style>
+          <p:txBody>
+            <a:bodyPr rtlCol="0" anchor="ctr"/>
+            <a:lstStyle/>
+            <a:p>
+              <a:pPr algn="ctr"/>
+              <a:endParaRPr lang="de-DE"/>
+            </a:p>
+          </p:txBody>
+        </p:sp>
+      </p:grpSp>
+      <p:sp>
+        <p:nvSpPr>
+          <p:cNvPr id="16" name="Rechteck 15">
+            <a:extLst>
+              <a:ext uri="{FF2B5EF4-FFF2-40B4-BE49-F238E27FC236}">
+                <a16:creationId xmlns:a16="http://schemas.microsoft.com/office/drawing/2014/main" id="{59C3A7AE-4176-5775-1F29-6C61475BE1DF}"/>
+              </a:ext>
+            </a:extLst>
+          </p:cNvPr>
+          <p:cNvSpPr/>
+          <p:nvPr/>
+        </p:nvSpPr>
+        <p:spPr>
+          <a:xfrm>
+            <a:off x="10255494" y="10035520"/>
+            <a:ext cx="526532" cy="350972"/>
+          </a:xfrm>
+          <a:prstGeom prst="rect">
+            <a:avLst/>
+          </a:prstGeom>
+          <a:solidFill>
+            <a:srgbClr val="FF00FF"/>
+          </a:solidFill>
+          <a:ln>
+            <a:noFill/>
+          </a:ln>
+        </p:spPr>
+        <p:style>
+          <a:lnRef idx="2">
+            <a:schemeClr val="accent1">
+              <a:shade val="15000"/>
+            </a:schemeClr>
+          </a:lnRef>
+          <a:fillRef idx="1">
+            <a:schemeClr val="accent1"/>
+          </a:fillRef>
+          <a:effectRef idx="0">
+            <a:schemeClr val="accent1"/>
+          </a:effectRef>
+          <a:fontRef idx="minor">
+            <a:schemeClr val="lt1"/>
+          </a:fontRef>
+        </p:style>
+        <p:txBody>
+          <a:bodyPr rtlCol="0" anchor="ctr"/>
+          <a:lstStyle/>
+          <a:p>
+            <a:pPr algn="ctr"/>
+            <a:endParaRPr lang="de-DE"/>
+          </a:p>
+        </p:txBody>
+      </p:sp>
+      <p:grpSp>
+        <p:nvGrpSpPr>
+          <p:cNvPr id="18" name="Gruppieren 17">
+            <a:extLst>
+              <a:ext uri="{FF2B5EF4-FFF2-40B4-BE49-F238E27FC236}">
+                <a16:creationId xmlns:a16="http://schemas.microsoft.com/office/drawing/2014/main" id="{52F838A6-71EB-4A3D-5BC1-02F5235F2C1E}"/>
+              </a:ext>
+            </a:extLst>
+          </p:cNvPr>
+          <p:cNvGrpSpPr/>
+          <p:nvPr/>
+        </p:nvGrpSpPr>
+        <p:grpSpPr>
+          <a:xfrm flipH="1">
+            <a:off x="10292103" y="9809563"/>
+            <a:ext cx="468902" cy="782838"/>
+            <a:chOff x="4918572" y="9800498"/>
+            <a:chExt cx="468902" cy="782838"/>
+          </a:xfrm>
+        </p:grpSpPr>
+        <p:sp>
+          <p:nvSpPr>
+            <p:cNvPr id="19" name="Parallelogramm 18">
+              <a:extLst>
+                <a:ext uri="{FF2B5EF4-FFF2-40B4-BE49-F238E27FC236}">
+                  <a16:creationId xmlns:a16="http://schemas.microsoft.com/office/drawing/2014/main" id="{5E5854B4-EE81-D7DD-991F-74E68182DABA}"/>
+                </a:ext>
+              </a:extLst>
+            </p:cNvPr>
+            <p:cNvSpPr/>
+            <p:nvPr/>
+          </p:nvSpPr>
+          <p:spPr>
+            <a:xfrm flipH="1">
+              <a:off x="5011163" y="9878606"/>
+              <a:ext cx="277245" cy="623303"/>
+            </a:xfrm>
+            <a:prstGeom prst="parallelogram">
+              <a:avLst>
+                <a:gd name="adj" fmla="val 59975"/>
+              </a:avLst>
+            </a:prstGeom>
+            <a:solidFill>
+              <a:schemeClr val="bg1"/>
+            </a:solidFill>
+            <a:ln w="12700">
+              <a:solidFill>
+                <a:schemeClr val="tx1"/>
+              </a:solidFill>
+            </a:ln>
+          </p:spPr>
+          <p:style>
+            <a:lnRef idx="2">
+              <a:schemeClr val="accent1">
+                <a:shade val="15000"/>
+              </a:schemeClr>
+            </a:lnRef>
+            <a:fillRef idx="1">
+              <a:schemeClr val="accent1"/>
+            </a:fillRef>
+            <a:effectRef idx="0">
+              <a:schemeClr val="accent1"/>
+            </a:effectRef>
+            <a:fontRef idx="minor">
+              <a:schemeClr val="lt1"/>
+            </a:fontRef>
+          </p:style>
+          <p:txBody>
+            <a:bodyPr rtlCol="0" anchor="ctr"/>
+            <a:lstStyle/>
+            <a:p>
+              <a:pPr algn="ctr"/>
+              <a:endParaRPr lang="de-DE"/>
+            </a:p>
+          </p:txBody>
+        </p:sp>
+        <p:sp>
+          <p:nvSpPr>
+            <p:cNvPr id="20" name="Rechteck 19">
+              <a:extLst>
+                <a:ext uri="{FF2B5EF4-FFF2-40B4-BE49-F238E27FC236}">
+                  <a16:creationId xmlns:a16="http://schemas.microsoft.com/office/drawing/2014/main" id="{1C6BB8B6-37AA-97F9-9EA0-172163F9F3DE}"/>
+                </a:ext>
+              </a:extLst>
+            </p:cNvPr>
+            <p:cNvSpPr/>
+            <p:nvPr/>
+          </p:nvSpPr>
+          <p:spPr>
+            <a:xfrm>
+              <a:off x="4918572" y="9800498"/>
+              <a:ext cx="277246" cy="104775"/>
+            </a:xfrm>
+            <a:prstGeom prst="rect">
+              <a:avLst/>
+            </a:prstGeom>
+            <a:solidFill>
+              <a:schemeClr val="bg1"/>
+            </a:solidFill>
+            <a:ln>
+              <a:solidFill>
+                <a:schemeClr val="bg1"/>
+              </a:solidFill>
+            </a:ln>
+          </p:spPr>
+          <p:style>
+            <a:lnRef idx="2">
+              <a:schemeClr val="accent1">
+                <a:shade val="15000"/>
+              </a:schemeClr>
+            </a:lnRef>
+            <a:fillRef idx="1">
+              <a:schemeClr val="accent1"/>
+            </a:fillRef>
+            <a:effectRef idx="0">
+              <a:schemeClr val="accent1"/>
+            </a:effectRef>
+            <a:fontRef idx="minor">
+              <a:schemeClr val="lt1"/>
+            </a:fontRef>
+          </p:style>
+          <p:txBody>
+            <a:bodyPr rtlCol="0" anchor="ctr"/>
+            <a:lstStyle/>
+            <a:p>
+              <a:pPr algn="ctr"/>
+              <a:endParaRPr lang="de-DE"/>
+            </a:p>
+          </p:txBody>
+        </p:sp>
+        <p:sp>
+          <p:nvSpPr>
+            <p:cNvPr id="21" name="Rechteck 20">
+              <a:extLst>
+                <a:ext uri="{FF2B5EF4-FFF2-40B4-BE49-F238E27FC236}">
+                  <a16:creationId xmlns:a16="http://schemas.microsoft.com/office/drawing/2014/main" id="{540453E5-C9F8-AA41-3864-242B9265F897}"/>
+                </a:ext>
+              </a:extLst>
+            </p:cNvPr>
+            <p:cNvSpPr/>
+            <p:nvPr/>
+          </p:nvSpPr>
+          <p:spPr>
+            <a:xfrm>
+              <a:off x="5110228" y="10478561"/>
+              <a:ext cx="277246" cy="104775"/>
+            </a:xfrm>
+            <a:prstGeom prst="rect">
+              <a:avLst/>
+            </a:prstGeom>
+            <a:solidFill>
+              <a:schemeClr val="bg1"/>
+            </a:solidFill>
+            <a:ln>
+              <a:solidFill>
+                <a:schemeClr val="bg1"/>
+              </a:solidFill>
+            </a:ln>
+          </p:spPr>
+          <p:style>
+            <a:lnRef idx="2">
+              <a:schemeClr val="accent1">
+                <a:shade val="15000"/>
+              </a:schemeClr>
+            </a:lnRef>
+            <a:fillRef idx="1">
+              <a:schemeClr val="accent1"/>
+            </a:fillRef>
+            <a:effectRef idx="0">
+              <a:schemeClr val="accent1"/>
+            </a:effectRef>
+            <a:fontRef idx="minor">
+              <a:schemeClr val="lt1"/>
+            </a:fontRef>
+          </p:style>
+          <p:txBody>
+            <a:bodyPr rtlCol="0" anchor="ctr"/>
+            <a:lstStyle/>
+            <a:p>
+              <a:pPr algn="ctr"/>
+              <a:endParaRPr lang="de-DE"/>
+            </a:p>
+          </p:txBody>
+        </p:sp>
+      </p:grpSp>
     </p:spTree>
     <p:extLst>
       <p:ext uri="{BB962C8B-B14F-4D97-AF65-F5344CB8AC3E}">

</xml_diff>

<commit_message>
Lots of small corrections
</commit_message>
<xml_diff>
--- a/figures/IPEC_Figure_AirGap.pptx
+++ b/figures/IPEC_Figure_AirGap.pptx
@@ -197,7 +197,7 @@
           <a:p>
             <a:fld id="{E12D018B-8A23-4312-B28B-6340BA8214C1}" type="datetimeFigureOut">
               <a:rPr lang="de-DE" smtClean="0"/>
-              <a:t>04.10.2025</a:t>
+              <a:t>15.10.2025</a:t>
             </a:fld>
             <a:endParaRPr lang="de-DE"/>
           </a:p>
@@ -721,7 +721,7 @@
           <a:p>
             <a:fld id="{ECCFC019-03F5-4F01-A944-8CA3CB0F4BCD}" type="datetimeFigureOut">
               <a:rPr lang="de-DE" smtClean="0"/>
-              <a:t>04.10.2025</a:t>
+              <a:t>15.10.2025</a:t>
             </a:fld>
             <a:endParaRPr lang="de-DE"/>
           </a:p>
@@ -891,7 +891,7 @@
           <a:p>
             <a:fld id="{ECCFC019-03F5-4F01-A944-8CA3CB0F4BCD}" type="datetimeFigureOut">
               <a:rPr lang="de-DE" smtClean="0"/>
-              <a:t>04.10.2025</a:t>
+              <a:t>15.10.2025</a:t>
             </a:fld>
             <a:endParaRPr lang="de-DE"/>
           </a:p>
@@ -1071,7 +1071,7 @@
           <a:p>
             <a:fld id="{ECCFC019-03F5-4F01-A944-8CA3CB0F4BCD}" type="datetimeFigureOut">
               <a:rPr lang="de-DE" smtClean="0"/>
-              <a:t>04.10.2025</a:t>
+              <a:t>15.10.2025</a:t>
             </a:fld>
             <a:endParaRPr lang="de-DE"/>
           </a:p>
@@ -1549,7 +1549,7 @@
           <a:p>
             <a:fld id="{ECCFC019-03F5-4F01-A944-8CA3CB0F4BCD}" type="datetimeFigureOut">
               <a:rPr lang="de-DE" smtClean="0"/>
-              <a:t>04.10.2025</a:t>
+              <a:t>15.10.2025</a:t>
             </a:fld>
             <a:endParaRPr lang="de-DE"/>
           </a:p>
@@ -1795,7 +1795,7 @@
           <a:p>
             <a:fld id="{ECCFC019-03F5-4F01-A944-8CA3CB0F4BCD}" type="datetimeFigureOut">
               <a:rPr lang="de-DE" smtClean="0"/>
-              <a:t>04.10.2025</a:t>
+              <a:t>15.10.2025</a:t>
             </a:fld>
             <a:endParaRPr lang="de-DE"/>
           </a:p>
@@ -2027,7 +2027,7 @@
           <a:p>
             <a:fld id="{ECCFC019-03F5-4F01-A944-8CA3CB0F4BCD}" type="datetimeFigureOut">
               <a:rPr lang="de-DE" smtClean="0"/>
-              <a:t>04.10.2025</a:t>
+              <a:t>15.10.2025</a:t>
             </a:fld>
             <a:endParaRPr lang="de-DE"/>
           </a:p>
@@ -2394,7 +2394,7 @@
           <a:p>
             <a:fld id="{ECCFC019-03F5-4F01-A944-8CA3CB0F4BCD}" type="datetimeFigureOut">
               <a:rPr lang="de-DE" smtClean="0"/>
-              <a:t>04.10.2025</a:t>
+              <a:t>15.10.2025</a:t>
             </a:fld>
             <a:endParaRPr lang="de-DE"/>
           </a:p>
@@ -2512,7 +2512,7 @@
           <a:p>
             <a:fld id="{ECCFC019-03F5-4F01-A944-8CA3CB0F4BCD}" type="datetimeFigureOut">
               <a:rPr lang="de-DE" smtClean="0"/>
-              <a:t>04.10.2025</a:t>
+              <a:t>15.10.2025</a:t>
             </a:fld>
             <a:endParaRPr lang="de-DE"/>
           </a:p>
@@ -2607,7 +2607,7 @@
           <a:p>
             <a:fld id="{ECCFC019-03F5-4F01-A944-8CA3CB0F4BCD}" type="datetimeFigureOut">
               <a:rPr lang="de-DE" smtClean="0"/>
-              <a:t>04.10.2025</a:t>
+              <a:t>15.10.2025</a:t>
             </a:fld>
             <a:endParaRPr lang="de-DE"/>
           </a:p>
@@ -2884,7 +2884,7 @@
           <a:p>
             <a:fld id="{ECCFC019-03F5-4F01-A944-8CA3CB0F4BCD}" type="datetimeFigureOut">
               <a:rPr lang="de-DE" smtClean="0"/>
-              <a:t>04.10.2025</a:t>
+              <a:t>15.10.2025</a:t>
             </a:fld>
             <a:endParaRPr lang="de-DE"/>
           </a:p>
@@ -3141,7 +3141,7 @@
           <a:p>
             <a:fld id="{ECCFC019-03F5-4F01-A944-8CA3CB0F4BCD}" type="datetimeFigureOut">
               <a:rPr lang="de-DE" smtClean="0"/>
-              <a:t>04.10.2025</a:t>
+              <a:t>15.10.2025</a:t>
             </a:fld>
             <a:endParaRPr lang="de-DE"/>
           </a:p>
@@ -3354,7 +3354,7 @@
           <a:p>
             <a:fld id="{ECCFC019-03F5-4F01-A944-8CA3CB0F4BCD}" type="datetimeFigureOut">
               <a:rPr lang="de-DE" smtClean="0"/>
-              <a:t>04.10.2025</a:t>
+              <a:t>15.10.2025</a:t>
             </a:fld>
             <a:endParaRPr lang="de-DE"/>
           </a:p>
@@ -7407,14 +7407,14 @@
           </p:cNvPr>
           <p:cNvCxnSpPr>
             <a:cxnSpLocks/>
-            <a:stCxn id="6" idx="3"/>
+            <a:stCxn id="6" idx="0"/>
           </p:cNvCxnSpPr>
           <p:nvPr/>
         </p:nvCxnSpPr>
         <p:spPr>
-          <a:xfrm>
-            <a:off x="5302574" y="2171698"/>
-            <a:ext cx="333309" cy="0"/>
+          <a:xfrm flipV="1">
+            <a:off x="4520529" y="390185"/>
+            <a:ext cx="1106554" cy="1449298"/>
           </a:xfrm>
           <a:prstGeom prst="line">
             <a:avLst/>
@@ -7451,15 +7451,14 @@
           </p:cNvPr>
           <p:cNvCxnSpPr>
             <a:cxnSpLocks/>
-            <a:stCxn id="9" idx="3"/>
-            <a:endCxn id="8" idx="3"/>
+            <a:stCxn id="9" idx="0"/>
           </p:cNvCxnSpPr>
           <p:nvPr/>
         </p:nvCxnSpPr>
         <p:spPr>
           <a:xfrm flipV="1">
-            <a:off x="5302573" y="4722904"/>
-            <a:ext cx="333310" cy="1"/>
+            <a:off x="4520528" y="3694992"/>
+            <a:ext cx="1106555" cy="695698"/>
           </a:xfrm>
           <a:prstGeom prst="line">
             <a:avLst/>
@@ -7496,15 +7495,14 @@
           </p:cNvPr>
           <p:cNvCxnSpPr>
             <a:cxnSpLocks/>
-            <a:stCxn id="10" idx="3"/>
-            <a:endCxn id="11" idx="3"/>
+            <a:stCxn id="10" idx="2"/>
           </p:cNvCxnSpPr>
           <p:nvPr/>
         </p:nvCxnSpPr>
         <p:spPr>
-          <a:xfrm flipV="1">
-            <a:off x="5302570" y="7918790"/>
-            <a:ext cx="333317" cy="3765"/>
+          <a:xfrm>
+            <a:off x="4520525" y="8254769"/>
+            <a:ext cx="1106558" cy="743036"/>
           </a:xfrm>
           <a:prstGeom prst="line">
             <a:avLst/>
@@ -7952,6 +7950,138 @@
           </p:txBody>
         </p:sp>
       </p:grpSp>
+      <p:cxnSp>
+        <p:nvCxnSpPr>
+          <p:cNvPr id="24" name="Gerader Verbinder 23">
+            <a:extLst>
+              <a:ext uri="{FF2B5EF4-FFF2-40B4-BE49-F238E27FC236}">
+                <a16:creationId xmlns:a16="http://schemas.microsoft.com/office/drawing/2014/main" id="{BC977A1D-FBE4-2D94-D37A-D4C2C531B065}"/>
+              </a:ext>
+            </a:extLst>
+          </p:cNvPr>
+          <p:cNvCxnSpPr>
+            <a:cxnSpLocks/>
+            <a:stCxn id="6" idx="2"/>
+          </p:cNvCxnSpPr>
+          <p:nvPr/>
+        </p:nvCxnSpPr>
+        <p:spPr>
+          <a:xfrm>
+            <a:off x="4520529" y="2503912"/>
+            <a:ext cx="1106554" cy="0"/>
+          </a:xfrm>
+          <a:prstGeom prst="line">
+            <a:avLst/>
+          </a:prstGeom>
+          <a:ln>
+            <a:solidFill>
+              <a:srgbClr val="FF0000"/>
+            </a:solidFill>
+          </a:ln>
+        </p:spPr>
+        <p:style>
+          <a:lnRef idx="2">
+            <a:schemeClr val="accent1"/>
+          </a:lnRef>
+          <a:fillRef idx="0">
+            <a:schemeClr val="accent1"/>
+          </a:fillRef>
+          <a:effectRef idx="1">
+            <a:schemeClr val="accent1"/>
+          </a:effectRef>
+          <a:fontRef idx="minor">
+            <a:schemeClr val="tx1"/>
+          </a:fontRef>
+        </p:style>
+      </p:cxnSp>
+      <p:cxnSp>
+        <p:nvCxnSpPr>
+          <p:cNvPr id="40" name="Gerader Verbinder 39">
+            <a:extLst>
+              <a:ext uri="{FF2B5EF4-FFF2-40B4-BE49-F238E27FC236}">
+                <a16:creationId xmlns:a16="http://schemas.microsoft.com/office/drawing/2014/main" id="{809B3AC3-C436-D26D-8745-083AF62172EC}"/>
+              </a:ext>
+            </a:extLst>
+          </p:cNvPr>
+          <p:cNvCxnSpPr>
+            <a:cxnSpLocks/>
+            <a:stCxn id="9" idx="2"/>
+          </p:cNvCxnSpPr>
+          <p:nvPr/>
+        </p:nvCxnSpPr>
+        <p:spPr>
+          <a:xfrm>
+            <a:off x="4520528" y="5055119"/>
+            <a:ext cx="1106555" cy="705125"/>
+          </a:xfrm>
+          <a:prstGeom prst="line">
+            <a:avLst/>
+          </a:prstGeom>
+          <a:ln>
+            <a:solidFill>
+              <a:srgbClr val="FF0000"/>
+            </a:solidFill>
+          </a:ln>
+        </p:spPr>
+        <p:style>
+          <a:lnRef idx="2">
+            <a:schemeClr val="accent1"/>
+          </a:lnRef>
+          <a:fillRef idx="0">
+            <a:schemeClr val="accent1"/>
+          </a:fillRef>
+          <a:effectRef idx="1">
+            <a:schemeClr val="accent1"/>
+          </a:effectRef>
+          <a:fontRef idx="minor">
+            <a:schemeClr val="tx1"/>
+          </a:fontRef>
+        </p:style>
+      </p:cxnSp>
+      <p:cxnSp>
+        <p:nvCxnSpPr>
+          <p:cNvPr id="43" name="Gerader Verbinder 42">
+            <a:extLst>
+              <a:ext uri="{FF2B5EF4-FFF2-40B4-BE49-F238E27FC236}">
+                <a16:creationId xmlns:a16="http://schemas.microsoft.com/office/drawing/2014/main" id="{40AEB488-93F9-BC47-0F57-59385250DF3C}"/>
+              </a:ext>
+            </a:extLst>
+          </p:cNvPr>
+          <p:cNvCxnSpPr>
+            <a:cxnSpLocks/>
+            <a:stCxn id="10" idx="0"/>
+          </p:cNvCxnSpPr>
+          <p:nvPr/>
+        </p:nvCxnSpPr>
+        <p:spPr>
+          <a:xfrm flipV="1">
+            <a:off x="4520525" y="6839775"/>
+            <a:ext cx="1106558" cy="750565"/>
+          </a:xfrm>
+          <a:prstGeom prst="line">
+            <a:avLst/>
+          </a:prstGeom>
+          <a:ln>
+            <a:solidFill>
+              <a:srgbClr val="FF0000"/>
+            </a:solidFill>
+          </a:ln>
+        </p:spPr>
+        <p:style>
+          <a:lnRef idx="2">
+            <a:schemeClr val="accent1"/>
+          </a:lnRef>
+          <a:fillRef idx="0">
+            <a:schemeClr val="accent1"/>
+          </a:fillRef>
+          <a:effectRef idx="1">
+            <a:schemeClr val="accent1"/>
+          </a:effectRef>
+          <a:fontRef idx="minor">
+            <a:schemeClr val="tx1"/>
+          </a:fontRef>
+        </p:style>
+      </p:cxnSp>
     </p:spTree>
     <p:extLst>
       <p:ext uri="{BB962C8B-B14F-4D97-AF65-F5344CB8AC3E}">

</xml_diff>